<commit_message>
location and international patients
</commit_message>
<xml_diff>
--- a/Hospital Website Final.pptx
+++ b/Hospital Website Final.pptx
@@ -301,7 +301,7 @@
             <a:fld id="{48A87A34-81AB-432B-8DAE-1953F412C126}" type="datetimeFigureOut">
               <a:rPr lang="en-US" dirty="0"/>
               <a:pPr/>
-              <a:t>6/26/2021</a:t>
+              <a:t>7/14/2021</a:t>
             </a:fld>
             <a:endParaRPr lang="en-US" dirty="0"/>
           </a:p>
@@ -565,7 +565,7 @@
             <a:fld id="{48A87A34-81AB-432B-8DAE-1953F412C126}" type="datetimeFigureOut">
               <a:rPr lang="en-US" dirty="0"/>
               <a:pPr/>
-              <a:t>6/26/2021</a:t>
+              <a:t>7/14/2021</a:t>
             </a:fld>
             <a:endParaRPr lang="en-US" dirty="0"/>
           </a:p>
@@ -793,7 +793,7 @@
             <a:fld id="{48A87A34-81AB-432B-8DAE-1953F412C126}" type="datetimeFigureOut">
               <a:rPr lang="en-US" dirty="0"/>
               <a:pPr/>
-              <a:t>6/26/2021</a:t>
+              <a:t>7/14/2021</a:t>
             </a:fld>
             <a:endParaRPr lang="en-US" dirty="0"/>
           </a:p>
@@ -1100,7 +1100,7 @@
             <a:fld id="{48A87A34-81AB-432B-8DAE-1953F412C126}" type="datetimeFigureOut">
               <a:rPr lang="en-US" dirty="0"/>
               <a:pPr/>
-              <a:t>6/26/2021</a:t>
+              <a:t>7/14/2021</a:t>
             </a:fld>
             <a:endParaRPr lang="en-US" dirty="0"/>
           </a:p>
@@ -1570,7 +1570,7 @@
             <a:fld id="{48A87A34-81AB-432B-8DAE-1953F412C126}" type="datetimeFigureOut">
               <a:rPr lang="en-US" dirty="0"/>
               <a:pPr/>
-              <a:t>6/26/2021</a:t>
+              <a:t>7/14/2021</a:t>
             </a:fld>
             <a:endParaRPr lang="en-US" dirty="0"/>
           </a:p>
@@ -2114,7 +2114,7 @@
             <a:fld id="{48A87A34-81AB-432B-8DAE-1953F412C126}" type="datetimeFigureOut">
               <a:rPr lang="en-US" dirty="0"/>
               <a:pPr/>
-              <a:t>6/26/2021</a:t>
+              <a:t>7/14/2021</a:t>
             </a:fld>
             <a:endParaRPr lang="en-US" dirty="0"/>
           </a:p>
@@ -2885,7 +2885,7 @@
             <a:fld id="{48A87A34-81AB-432B-8DAE-1953F412C126}" type="datetimeFigureOut">
               <a:rPr lang="en-US" dirty="0"/>
               <a:pPr/>
-              <a:t>6/26/2021</a:t>
+              <a:t>7/14/2021</a:t>
             </a:fld>
             <a:endParaRPr lang="en-US" dirty="0"/>
           </a:p>
@@ -3057,7 +3057,7 @@
             <a:fld id="{48A87A34-81AB-432B-8DAE-1953F412C126}" type="datetimeFigureOut">
               <a:rPr lang="en-US" dirty="0"/>
               <a:pPr/>
-              <a:t>6/26/2021</a:t>
+              <a:t>7/14/2021</a:t>
             </a:fld>
             <a:endParaRPr lang="en-US" dirty="0"/>
           </a:p>
@@ -3277,7 +3277,7 @@
             <a:fld id="{48A87A34-81AB-432B-8DAE-1953F412C126}" type="datetimeFigureOut">
               <a:rPr lang="en-US" dirty="0"/>
               <a:pPr/>
-              <a:t>6/26/2021</a:t>
+              <a:t>7/14/2021</a:t>
             </a:fld>
             <a:endParaRPr lang="en-US" dirty="0"/>
           </a:p>
@@ -3454,7 +3454,7 @@
             <a:fld id="{48A87A34-81AB-432B-8DAE-1953F412C126}" type="datetimeFigureOut">
               <a:rPr lang="en-US" dirty="0"/>
               <a:pPr/>
-              <a:t>6/26/2021</a:t>
+              <a:t>7/14/2021</a:t>
             </a:fld>
             <a:endParaRPr lang="en-US" dirty="0"/>
           </a:p>
@@ -3740,7 +3740,7 @@
             <a:fld id="{48A87A34-81AB-432B-8DAE-1953F412C126}" type="datetimeFigureOut">
               <a:rPr lang="en-US" dirty="0"/>
               <a:pPr/>
-              <a:t>6/26/2021</a:t>
+              <a:t>7/14/2021</a:t>
             </a:fld>
             <a:endParaRPr lang="en-US" dirty="0"/>
           </a:p>
@@ -3979,7 +3979,7 @@
             <a:fld id="{48A87A34-81AB-432B-8DAE-1953F412C126}" type="datetimeFigureOut">
               <a:rPr lang="en-US" dirty="0"/>
               <a:pPr/>
-              <a:t>6/26/2021</a:t>
+              <a:t>7/14/2021</a:t>
             </a:fld>
             <a:endParaRPr lang="en-US" dirty="0"/>
           </a:p>
@@ -4355,7 +4355,7 @@
             <a:fld id="{48A87A34-81AB-432B-8DAE-1953F412C126}" type="datetimeFigureOut">
               <a:rPr lang="en-US" dirty="0"/>
               <a:pPr/>
-              <a:t>6/26/2021</a:t>
+              <a:t>7/14/2021</a:t>
             </a:fld>
             <a:endParaRPr lang="en-US" dirty="0"/>
           </a:p>
@@ -4470,7 +4470,7 @@
             <a:fld id="{48A87A34-81AB-432B-8DAE-1953F412C126}" type="datetimeFigureOut">
               <a:rPr lang="en-US" dirty="0"/>
               <a:pPr/>
-              <a:t>6/26/2021</a:t>
+              <a:t>7/14/2021</a:t>
             </a:fld>
             <a:endParaRPr lang="en-US" dirty="0"/>
           </a:p>
@@ -4562,7 +4562,7 @@
             <a:fld id="{48A87A34-81AB-432B-8DAE-1953F412C126}" type="datetimeFigureOut">
               <a:rPr lang="en-US" dirty="0"/>
               <a:pPr/>
-              <a:t>6/26/2021</a:t>
+              <a:t>7/14/2021</a:t>
             </a:fld>
             <a:endParaRPr lang="en-US" dirty="0"/>
           </a:p>
@@ -4808,7 +4808,7 @@
             <a:fld id="{48A87A34-81AB-432B-8DAE-1953F412C126}" type="datetimeFigureOut">
               <a:rPr lang="en-US" dirty="0"/>
               <a:pPr/>
-              <a:t>6/26/2021</a:t>
+              <a:t>7/14/2021</a:t>
             </a:fld>
             <a:endParaRPr lang="en-US" dirty="0"/>
           </a:p>
@@ -5062,7 +5062,7 @@
             <a:fld id="{48A87A34-81AB-432B-8DAE-1953F412C126}" type="datetimeFigureOut">
               <a:rPr lang="en-US" dirty="0"/>
               <a:pPr/>
-              <a:t>6/26/2021</a:t>
+              <a:t>7/14/2021</a:t>
             </a:fld>
             <a:endParaRPr lang="en-US" dirty="0"/>
           </a:p>
@@ -5302,7 +5302,7 @@
             <a:fld id="{48A87A34-81AB-432B-8DAE-1953F412C126}" type="datetimeFigureOut">
               <a:rPr lang="en-US" dirty="0"/>
               <a:pPr/>
-              <a:t>6/26/2021</a:t>
+              <a:t>7/14/2021</a:t>
             </a:fld>
             <a:endParaRPr lang="en-US" dirty="0"/>
           </a:p>
@@ -6000,7 +6000,7 @@
                             </p:stCondLst>
                             <p:childTnLst>
                               <p:par>
-                                <p:cTn id="11" presetID="8" presetClass="entr" presetSubtype="16" fill="hold" grpId="1" nodeType="clickEffect">
+                                <p:cTn id="11" presetID="22" presetClass="entr" presetSubtype="4" fill="hold" grpId="1" nodeType="clickEffect">
                                   <p:stCondLst>
                                     <p:cond delay="0"/>
                                   </p:stCondLst>
@@ -6023,9 +6023,9 @@
                                         <p:strVal val="visible"/>
                                       </p:to>
                                     </p:set>
-                                    <p:animEffect transition="in" filter="diamond(in)">
-                                      <p:cBhvr>
-                                        <p:cTn id="13" dur="2000"/>
+                                    <p:animEffect transition="in" filter="wipe(down)">
+                                      <p:cBhvr>
+                                        <p:cTn id="13" dur="500"/>
                                         <p:tgtEl>
                                           <p:spTgt spid="4"/>
                                         </p:tgtEl>
@@ -6176,33 +6176,15 @@
                                   </p:childTnLst>
                                 </p:cTn>
                               </p:par>
-                            </p:childTnLst>
-                          </p:cTn>
-                        </p:par>
-                      </p:childTnLst>
-                    </p:cTn>
-                  </p:par>
-                  <p:par>
-                    <p:cTn id="22" fill="hold">
-                      <p:stCondLst>
-                        <p:cond delay="indefinite"/>
-                      </p:stCondLst>
-                      <p:childTnLst>
-                        <p:par>
-                          <p:cTn id="23" fill="hold">
-                            <p:stCondLst>
-                              <p:cond delay="0"/>
-                            </p:stCondLst>
-                            <p:childTnLst>
                               <p:par>
-                                <p:cTn id="24" presetID="49" presetClass="entr" presetSubtype="0" decel="100000" fill="hold" grpId="0" nodeType="clickEffect">
+                                <p:cTn id="22" presetID="49" presetClass="entr" presetSubtype="0" decel="100000" fill="hold" grpId="0" nodeType="withEffect">
                                   <p:stCondLst>
                                     <p:cond delay="0"/>
                                   </p:stCondLst>
                                   <p:childTnLst>
                                     <p:set>
                                       <p:cBhvr>
-                                        <p:cTn id="25" dur="1" fill="hold">
+                                        <p:cTn id="23" dur="1" fill="hold">
                                           <p:stCondLst>
                                             <p:cond delay="0"/>
                                           </p:stCondLst>
@@ -6224,7 +6206,7 @@
                                     </p:set>
                                     <p:anim calcmode="lin" valueType="num">
                                       <p:cBhvr>
-                                        <p:cTn id="26" dur="500" fill="hold"/>
+                                        <p:cTn id="24" dur="500" fill="hold"/>
                                         <p:tgtEl>
                                           <p:spTgt spid="3">
                                             <p:txEl>
@@ -6251,7 +6233,7 @@
                                     </p:anim>
                                     <p:anim calcmode="lin" valueType="num">
                                       <p:cBhvr>
-                                        <p:cTn id="27" dur="500" fill="hold"/>
+                                        <p:cTn id="25" dur="500" fill="hold"/>
                                         <p:tgtEl>
                                           <p:spTgt spid="3">
                                             <p:txEl>
@@ -6278,7 +6260,7 @@
                                     </p:anim>
                                     <p:anim calcmode="lin" valueType="num">
                                       <p:cBhvr>
-                                        <p:cTn id="28" dur="500" fill="hold"/>
+                                        <p:cTn id="26" dur="500" fill="hold"/>
                                         <p:tgtEl>
                                           <p:spTgt spid="3">
                                             <p:txEl>
@@ -6305,7 +6287,7 @@
                                     </p:anim>
                                     <p:animEffect transition="in" filter="fade">
                                       <p:cBhvr>
-                                        <p:cTn id="29" dur="500"/>
+                                        <p:cTn id="27" dur="500"/>
                                         <p:tgtEl>
                                           <p:spTgt spid="3">
                                             <p:txEl>
@@ -6318,33 +6300,15 @@
                                   </p:childTnLst>
                                 </p:cTn>
                               </p:par>
-                            </p:childTnLst>
-                          </p:cTn>
-                        </p:par>
-                      </p:childTnLst>
-                    </p:cTn>
-                  </p:par>
-                  <p:par>
-                    <p:cTn id="30" fill="hold">
-                      <p:stCondLst>
-                        <p:cond delay="indefinite"/>
-                      </p:stCondLst>
-                      <p:childTnLst>
-                        <p:par>
-                          <p:cTn id="31" fill="hold">
-                            <p:stCondLst>
-                              <p:cond delay="0"/>
-                            </p:stCondLst>
-                            <p:childTnLst>
                               <p:par>
-                                <p:cTn id="32" presetID="49" presetClass="entr" presetSubtype="0" decel="100000" fill="hold" grpId="0" nodeType="clickEffect">
+                                <p:cTn id="28" presetID="49" presetClass="entr" presetSubtype="0" decel="100000" fill="hold" grpId="0" nodeType="withEffect">
                                   <p:stCondLst>
                                     <p:cond delay="0"/>
                                   </p:stCondLst>
                                   <p:childTnLst>
                                     <p:set>
                                       <p:cBhvr>
-                                        <p:cTn id="33" dur="1" fill="hold">
+                                        <p:cTn id="29" dur="1" fill="hold">
                                           <p:stCondLst>
                                             <p:cond delay="0"/>
                                           </p:stCondLst>
@@ -6366,7 +6330,7 @@
                                     </p:set>
                                     <p:anim calcmode="lin" valueType="num">
                                       <p:cBhvr>
-                                        <p:cTn id="34" dur="500" fill="hold"/>
+                                        <p:cTn id="30" dur="500" fill="hold"/>
                                         <p:tgtEl>
                                           <p:spTgt spid="3">
                                             <p:txEl>
@@ -6393,7 +6357,7 @@
                                     </p:anim>
                                     <p:anim calcmode="lin" valueType="num">
                                       <p:cBhvr>
-                                        <p:cTn id="35" dur="500" fill="hold"/>
+                                        <p:cTn id="31" dur="500" fill="hold"/>
                                         <p:tgtEl>
                                           <p:spTgt spid="3">
                                             <p:txEl>
@@ -6420,7 +6384,7 @@
                                     </p:anim>
                                     <p:anim calcmode="lin" valueType="num">
                                       <p:cBhvr>
-                                        <p:cTn id="36" dur="500" fill="hold"/>
+                                        <p:cTn id="32" dur="500" fill="hold"/>
                                         <p:tgtEl>
                                           <p:spTgt spid="3">
                                             <p:txEl>
@@ -6447,7 +6411,7 @@
                                     </p:anim>
                                     <p:animEffect transition="in" filter="fade">
                                       <p:cBhvr>
-                                        <p:cTn id="37" dur="500"/>
+                                        <p:cTn id="33" dur="500"/>
                                         <p:tgtEl>
                                           <p:spTgt spid="3">
                                             <p:txEl>
@@ -6460,33 +6424,15 @@
                                   </p:childTnLst>
                                 </p:cTn>
                               </p:par>
-                            </p:childTnLst>
-                          </p:cTn>
-                        </p:par>
-                      </p:childTnLst>
-                    </p:cTn>
-                  </p:par>
-                  <p:par>
-                    <p:cTn id="38" fill="hold">
-                      <p:stCondLst>
-                        <p:cond delay="indefinite"/>
-                      </p:stCondLst>
-                      <p:childTnLst>
-                        <p:par>
-                          <p:cTn id="39" fill="hold">
-                            <p:stCondLst>
-                              <p:cond delay="0"/>
-                            </p:stCondLst>
-                            <p:childTnLst>
                               <p:par>
-                                <p:cTn id="40" presetID="49" presetClass="entr" presetSubtype="0" decel="100000" fill="hold" grpId="0" nodeType="clickEffect">
+                                <p:cTn id="34" presetID="49" presetClass="entr" presetSubtype="0" decel="100000" fill="hold" grpId="0" nodeType="withEffect">
                                   <p:stCondLst>
                                     <p:cond delay="0"/>
                                   </p:stCondLst>
                                   <p:childTnLst>
                                     <p:set>
                                       <p:cBhvr>
-                                        <p:cTn id="41" dur="1" fill="hold">
+                                        <p:cTn id="35" dur="1" fill="hold">
                                           <p:stCondLst>
                                             <p:cond delay="0"/>
                                           </p:stCondLst>
@@ -6508,7 +6454,7 @@
                                     </p:set>
                                     <p:anim calcmode="lin" valueType="num">
                                       <p:cBhvr>
-                                        <p:cTn id="42" dur="500" fill="hold"/>
+                                        <p:cTn id="36" dur="500" fill="hold"/>
                                         <p:tgtEl>
                                           <p:spTgt spid="3">
                                             <p:txEl>
@@ -6535,7 +6481,7 @@
                                     </p:anim>
                                     <p:anim calcmode="lin" valueType="num">
                                       <p:cBhvr>
-                                        <p:cTn id="43" dur="500" fill="hold"/>
+                                        <p:cTn id="37" dur="500" fill="hold"/>
                                         <p:tgtEl>
                                           <p:spTgt spid="3">
                                             <p:txEl>
@@ -6562,7 +6508,7 @@
                                     </p:anim>
                                     <p:anim calcmode="lin" valueType="num">
                                       <p:cBhvr>
-                                        <p:cTn id="44" dur="500" fill="hold"/>
+                                        <p:cTn id="38" dur="500" fill="hold"/>
                                         <p:tgtEl>
                                           <p:spTgt spid="3">
                                             <p:txEl>
@@ -6589,7 +6535,7 @@
                                     </p:anim>
                                     <p:animEffect transition="in" filter="fade">
                                       <p:cBhvr>
-                                        <p:cTn id="45" dur="500"/>
+                                        <p:cTn id="39" dur="500"/>
                                         <p:tgtEl>
                                           <p:spTgt spid="3">
                                             <p:txEl>
@@ -6602,33 +6548,15 @@
                                   </p:childTnLst>
                                 </p:cTn>
                               </p:par>
-                            </p:childTnLst>
-                          </p:cTn>
-                        </p:par>
-                      </p:childTnLst>
-                    </p:cTn>
-                  </p:par>
-                  <p:par>
-                    <p:cTn id="46" fill="hold">
-                      <p:stCondLst>
-                        <p:cond delay="indefinite"/>
-                      </p:stCondLst>
-                      <p:childTnLst>
-                        <p:par>
-                          <p:cTn id="47" fill="hold">
-                            <p:stCondLst>
-                              <p:cond delay="0"/>
-                            </p:stCondLst>
-                            <p:childTnLst>
                               <p:par>
-                                <p:cTn id="48" presetID="49" presetClass="entr" presetSubtype="0" decel="100000" fill="hold" grpId="0" nodeType="clickEffect">
+                                <p:cTn id="40" presetID="49" presetClass="entr" presetSubtype="0" decel="100000" fill="hold" grpId="0" nodeType="withEffect">
                                   <p:stCondLst>
                                     <p:cond delay="0"/>
                                   </p:stCondLst>
                                   <p:childTnLst>
                                     <p:set>
                                       <p:cBhvr>
-                                        <p:cTn id="49" dur="1" fill="hold">
+                                        <p:cTn id="41" dur="1" fill="hold">
                                           <p:stCondLst>
                                             <p:cond delay="0"/>
                                           </p:stCondLst>
@@ -6650,7 +6578,7 @@
                                     </p:set>
                                     <p:anim calcmode="lin" valueType="num">
                                       <p:cBhvr>
-                                        <p:cTn id="50" dur="500" fill="hold"/>
+                                        <p:cTn id="42" dur="500" fill="hold"/>
                                         <p:tgtEl>
                                           <p:spTgt spid="3">
                                             <p:txEl>
@@ -6677,7 +6605,7 @@
                                     </p:anim>
                                     <p:anim calcmode="lin" valueType="num">
                                       <p:cBhvr>
-                                        <p:cTn id="51" dur="500" fill="hold"/>
+                                        <p:cTn id="43" dur="500" fill="hold"/>
                                         <p:tgtEl>
                                           <p:spTgt spid="3">
                                             <p:txEl>
@@ -6704,7 +6632,7 @@
                                     </p:anim>
                                     <p:anim calcmode="lin" valueType="num">
                                       <p:cBhvr>
-                                        <p:cTn id="52" dur="500" fill="hold"/>
+                                        <p:cTn id="44" dur="500" fill="hold"/>
                                         <p:tgtEl>
                                           <p:spTgt spid="3">
                                             <p:txEl>
@@ -6731,7 +6659,7 @@
                                     </p:anim>
                                     <p:animEffect transition="in" filter="fade">
                                       <p:cBhvr>
-                                        <p:cTn id="53" dur="500"/>
+                                        <p:cTn id="45" dur="500"/>
                                         <p:tgtEl>
                                           <p:spTgt spid="3">
                                             <p:txEl>
@@ -6744,33 +6672,15 @@
                                   </p:childTnLst>
                                 </p:cTn>
                               </p:par>
-                            </p:childTnLst>
-                          </p:cTn>
-                        </p:par>
-                      </p:childTnLst>
-                    </p:cTn>
-                  </p:par>
-                  <p:par>
-                    <p:cTn id="54" fill="hold">
-                      <p:stCondLst>
-                        <p:cond delay="indefinite"/>
-                      </p:stCondLst>
-                      <p:childTnLst>
-                        <p:par>
-                          <p:cTn id="55" fill="hold">
-                            <p:stCondLst>
-                              <p:cond delay="0"/>
-                            </p:stCondLst>
-                            <p:childTnLst>
                               <p:par>
-                                <p:cTn id="56" presetID="49" presetClass="entr" presetSubtype="0" decel="100000" fill="hold" grpId="0" nodeType="clickEffect">
+                                <p:cTn id="46" presetID="49" presetClass="entr" presetSubtype="0" decel="100000" fill="hold" grpId="0" nodeType="withEffect">
                                   <p:stCondLst>
                                     <p:cond delay="0"/>
                                   </p:stCondLst>
                                   <p:childTnLst>
                                     <p:set>
                                       <p:cBhvr>
-                                        <p:cTn id="57" dur="1" fill="hold">
+                                        <p:cTn id="47" dur="1" fill="hold">
                                           <p:stCondLst>
                                             <p:cond delay="0"/>
                                           </p:stCondLst>
@@ -6792,7 +6702,7 @@
                                     </p:set>
                                     <p:anim calcmode="lin" valueType="num">
                                       <p:cBhvr>
-                                        <p:cTn id="58" dur="500" fill="hold"/>
+                                        <p:cTn id="48" dur="500" fill="hold"/>
                                         <p:tgtEl>
                                           <p:spTgt spid="3">
                                             <p:txEl>
@@ -6819,7 +6729,7 @@
                                     </p:anim>
                                     <p:anim calcmode="lin" valueType="num">
                                       <p:cBhvr>
-                                        <p:cTn id="59" dur="500" fill="hold"/>
+                                        <p:cTn id="49" dur="500" fill="hold"/>
                                         <p:tgtEl>
                                           <p:spTgt spid="3">
                                             <p:txEl>
@@ -6846,7 +6756,7 @@
                                     </p:anim>
                                     <p:anim calcmode="lin" valueType="num">
                                       <p:cBhvr>
-                                        <p:cTn id="60" dur="500" fill="hold"/>
+                                        <p:cTn id="50" dur="500" fill="hold"/>
                                         <p:tgtEl>
                                           <p:spTgt spid="3">
                                             <p:txEl>
@@ -6873,7 +6783,7 @@
                                     </p:anim>
                                     <p:animEffect transition="in" filter="fade">
                                       <p:cBhvr>
-                                        <p:cTn id="61" dur="500"/>
+                                        <p:cTn id="51" dur="500"/>
                                         <p:tgtEl>
                                           <p:spTgt spid="3">
                                             <p:txEl>
@@ -6916,7 +6826,7 @@
     <p:bldLst>
       <p:bldP spid="4" grpId="1" animBg="1"/>
       <p:bldP spid="2" grpId="0"/>
-      <p:bldP spid="3" grpId="0" build="p"/>
+      <p:bldP spid="3" grpId="0" uiExpand="1" build="p"/>
     </p:bldLst>
   </p:timing>
 </p:sld>
@@ -7277,33 +7187,15 @@
                                   </p:childTnLst>
                                 </p:cTn>
                               </p:par>
-                            </p:childTnLst>
-                          </p:cTn>
-                        </p:par>
-                      </p:childTnLst>
-                    </p:cTn>
-                  </p:par>
-                  <p:par>
-                    <p:cTn id="16" fill="hold">
-                      <p:stCondLst>
-                        <p:cond delay="indefinite"/>
-                      </p:stCondLst>
-                      <p:childTnLst>
-                        <p:par>
-                          <p:cTn id="17" fill="hold">
-                            <p:stCondLst>
-                              <p:cond delay="0"/>
-                            </p:stCondLst>
-                            <p:childTnLst>
                               <p:par>
-                                <p:cTn id="18" presetID="22" presetClass="entr" presetSubtype="4" fill="hold" nodeType="clickEffect">
+                                <p:cTn id="16" presetID="22" presetClass="entr" presetSubtype="4" fill="hold" nodeType="withEffect">
                                   <p:stCondLst>
                                     <p:cond delay="0"/>
                                   </p:stCondLst>
                                   <p:childTnLst>
                                     <p:set>
                                       <p:cBhvr>
-                                        <p:cTn id="19" dur="1" fill="hold">
+                                        <p:cTn id="17" dur="1" fill="hold">
                                           <p:stCondLst>
                                             <p:cond delay="0"/>
                                           </p:stCondLst>
@@ -7325,7 +7217,7 @@
                                     </p:set>
                                     <p:animEffect transition="in" filter="wipe(down)">
                                       <p:cBhvr>
-                                        <p:cTn id="20" dur="500"/>
+                                        <p:cTn id="18" dur="500"/>
                                         <p:tgtEl>
                                           <p:spTgt spid="3">
                                             <p:txEl>
@@ -7338,33 +7230,15 @@
                                   </p:childTnLst>
                                 </p:cTn>
                               </p:par>
-                            </p:childTnLst>
-                          </p:cTn>
-                        </p:par>
-                      </p:childTnLst>
-                    </p:cTn>
-                  </p:par>
-                  <p:par>
-                    <p:cTn id="21" fill="hold">
-                      <p:stCondLst>
-                        <p:cond delay="indefinite"/>
-                      </p:stCondLst>
-                      <p:childTnLst>
-                        <p:par>
-                          <p:cTn id="22" fill="hold">
-                            <p:stCondLst>
-                              <p:cond delay="0"/>
-                            </p:stCondLst>
-                            <p:childTnLst>
                               <p:par>
-                                <p:cTn id="23" presetID="22" presetClass="entr" presetSubtype="4" fill="hold" nodeType="clickEffect">
+                                <p:cTn id="19" presetID="22" presetClass="entr" presetSubtype="4" fill="hold" nodeType="withEffect">
                                   <p:stCondLst>
                                     <p:cond delay="0"/>
                                   </p:stCondLst>
                                   <p:childTnLst>
                                     <p:set>
                                       <p:cBhvr>
-                                        <p:cTn id="24" dur="1" fill="hold">
+                                        <p:cTn id="20" dur="1" fill="hold">
                                           <p:stCondLst>
                                             <p:cond delay="0"/>
                                           </p:stCondLst>
@@ -7386,7 +7260,7 @@
                                     </p:set>
                                     <p:animEffect transition="in" filter="wipe(down)">
                                       <p:cBhvr>
-                                        <p:cTn id="25" dur="500"/>
+                                        <p:cTn id="21" dur="500"/>
                                         <p:tgtEl>
                                           <p:spTgt spid="3">
                                             <p:txEl>
@@ -7399,33 +7273,15 @@
                                   </p:childTnLst>
                                 </p:cTn>
                               </p:par>
-                            </p:childTnLst>
-                          </p:cTn>
-                        </p:par>
-                      </p:childTnLst>
-                    </p:cTn>
-                  </p:par>
-                  <p:par>
-                    <p:cTn id="26" fill="hold">
-                      <p:stCondLst>
-                        <p:cond delay="indefinite"/>
-                      </p:stCondLst>
-                      <p:childTnLst>
-                        <p:par>
-                          <p:cTn id="27" fill="hold">
-                            <p:stCondLst>
-                              <p:cond delay="0"/>
-                            </p:stCondLst>
-                            <p:childTnLst>
                               <p:par>
-                                <p:cTn id="28" presetID="22" presetClass="entr" presetSubtype="4" fill="hold" nodeType="clickEffect">
+                                <p:cTn id="22" presetID="22" presetClass="entr" presetSubtype="4" fill="hold" nodeType="withEffect">
                                   <p:stCondLst>
                                     <p:cond delay="0"/>
                                   </p:stCondLst>
                                   <p:childTnLst>
                                     <p:set>
                                       <p:cBhvr>
-                                        <p:cTn id="29" dur="1" fill="hold">
+                                        <p:cTn id="23" dur="1" fill="hold">
                                           <p:stCondLst>
                                             <p:cond delay="0"/>
                                           </p:stCondLst>
@@ -7447,7 +7303,7 @@
                                     </p:set>
                                     <p:animEffect transition="in" filter="wipe(down)">
                                       <p:cBhvr>
-                                        <p:cTn id="30" dur="500"/>
+                                        <p:cTn id="24" dur="500"/>
                                         <p:tgtEl>
                                           <p:spTgt spid="3">
                                             <p:txEl>
@@ -7844,33 +7700,15 @@
                                   </p:childTnLst>
                                 </p:cTn>
                               </p:par>
-                            </p:childTnLst>
-                          </p:cTn>
-                        </p:par>
-                      </p:childTnLst>
-                    </p:cTn>
-                  </p:par>
-                  <p:par>
-                    <p:cTn id="16" fill="hold">
-                      <p:stCondLst>
-                        <p:cond delay="indefinite"/>
-                      </p:stCondLst>
-                      <p:childTnLst>
-                        <p:par>
-                          <p:cTn id="17" fill="hold">
-                            <p:stCondLst>
-                              <p:cond delay="0"/>
-                            </p:stCondLst>
-                            <p:childTnLst>
                               <p:par>
-                                <p:cTn id="18" presetID="12" presetClass="entr" presetSubtype="4" fill="hold" grpId="0" nodeType="clickEffect">
+                                <p:cTn id="16" presetID="12" presetClass="entr" presetSubtype="4" fill="hold" grpId="0" nodeType="withEffect">
                                   <p:stCondLst>
                                     <p:cond delay="0"/>
                                   </p:stCondLst>
                                   <p:childTnLst>
                                     <p:set>
                                       <p:cBhvr>
-                                        <p:cTn id="19" dur="1" fill="hold">
+                                        <p:cTn id="17" dur="1" fill="hold">
                                           <p:stCondLst>
                                             <p:cond delay="0"/>
                                           </p:stCondLst>
@@ -7892,7 +7730,7 @@
                                     </p:set>
                                     <p:animEffect transition="in" filter="slide(fromBottom)">
                                       <p:cBhvr>
-                                        <p:cTn id="20" dur="500"/>
+                                        <p:cTn id="18" dur="500"/>
                                         <p:tgtEl>
                                           <p:spTgt spid="3">
                                             <p:txEl>
@@ -7905,33 +7743,15 @@
                                   </p:childTnLst>
                                 </p:cTn>
                               </p:par>
-                            </p:childTnLst>
-                          </p:cTn>
-                        </p:par>
-                      </p:childTnLst>
-                    </p:cTn>
-                  </p:par>
-                  <p:par>
-                    <p:cTn id="21" fill="hold">
-                      <p:stCondLst>
-                        <p:cond delay="indefinite"/>
-                      </p:stCondLst>
-                      <p:childTnLst>
-                        <p:par>
-                          <p:cTn id="22" fill="hold">
-                            <p:stCondLst>
-                              <p:cond delay="0"/>
-                            </p:stCondLst>
-                            <p:childTnLst>
                               <p:par>
-                                <p:cTn id="23" presetID="12" presetClass="entr" presetSubtype="4" fill="hold" grpId="0" nodeType="clickEffect">
+                                <p:cTn id="19" presetID="12" presetClass="entr" presetSubtype="4" fill="hold" grpId="0" nodeType="withEffect">
                                   <p:stCondLst>
                                     <p:cond delay="0"/>
                                   </p:stCondLst>
                                   <p:childTnLst>
                                     <p:set>
                                       <p:cBhvr>
-                                        <p:cTn id="24" dur="1" fill="hold">
+                                        <p:cTn id="20" dur="1" fill="hold">
                                           <p:stCondLst>
                                             <p:cond delay="0"/>
                                           </p:stCondLst>
@@ -7953,7 +7773,7 @@
                                     </p:set>
                                     <p:animEffect transition="in" filter="slide(fromBottom)">
                                       <p:cBhvr>
-                                        <p:cTn id="25" dur="500"/>
+                                        <p:cTn id="21" dur="500"/>
                                         <p:tgtEl>
                                           <p:spTgt spid="3">
                                             <p:txEl>
@@ -7966,33 +7786,15 @@
                                   </p:childTnLst>
                                 </p:cTn>
                               </p:par>
-                            </p:childTnLst>
-                          </p:cTn>
-                        </p:par>
-                      </p:childTnLst>
-                    </p:cTn>
-                  </p:par>
-                  <p:par>
-                    <p:cTn id="26" fill="hold">
-                      <p:stCondLst>
-                        <p:cond delay="indefinite"/>
-                      </p:stCondLst>
-                      <p:childTnLst>
-                        <p:par>
-                          <p:cTn id="27" fill="hold">
-                            <p:stCondLst>
-                              <p:cond delay="0"/>
-                            </p:stCondLst>
-                            <p:childTnLst>
                               <p:par>
-                                <p:cTn id="28" presetID="12" presetClass="entr" presetSubtype="4" fill="hold" grpId="0" nodeType="clickEffect">
+                                <p:cTn id="22" presetID="12" presetClass="entr" presetSubtype="4" fill="hold" grpId="0" nodeType="withEffect">
                                   <p:stCondLst>
                                     <p:cond delay="0"/>
                                   </p:stCondLst>
                                   <p:childTnLst>
                                     <p:set>
                                       <p:cBhvr>
-                                        <p:cTn id="29" dur="1" fill="hold">
+                                        <p:cTn id="23" dur="1" fill="hold">
                                           <p:stCondLst>
                                             <p:cond delay="0"/>
                                           </p:stCondLst>
@@ -8014,7 +7816,7 @@
                                     </p:set>
                                     <p:animEffect transition="in" filter="slide(fromBottom)">
                                       <p:cBhvr>
-                                        <p:cTn id="30" dur="500"/>
+                                        <p:cTn id="24" dur="500"/>
                                         <p:tgtEl>
                                           <p:spTgt spid="3">
                                             <p:txEl>
@@ -8056,7 +7858,7 @@
     </p:tnLst>
     <p:bldLst>
       <p:bldP spid="2" grpId="0"/>
-      <p:bldP spid="3" grpId="0" build="p"/>
+      <p:bldP spid="3" grpId="0" uiExpand="1" build="p"/>
     </p:bldLst>
   </p:timing>
 </p:sld>
@@ -8895,7 +8697,25 @@
                           </a:solidFill>
                           <a:latin typeface="Bahnschrift SemiLight" pitchFamily="34" charset="0"/>
                         </a:rPr>
-                        <a:t>The aim of this research paper is to examine the content of the hospital websites and asses them as information repository or as an interactive online communication mean. Five element were analyzed. Technical items, Hospital information and facilities, Admissions and medical services, Interactive online services and External Activities.</a:t>
+                        <a:t>The aim of this research paper is to examine the content of the hospital websites </a:t>
+                      </a:r>
+                      <a:r>
+                        <a:rPr lang="en-US" sz="2000" b="1" smtClean="0">
+                          <a:solidFill>
+                            <a:schemeClr val="bg1"/>
+                          </a:solidFill>
+                          <a:latin typeface="Bahnschrift SemiLight" pitchFamily="34" charset="0"/>
+                        </a:rPr>
+                        <a:t>and assess </a:t>
+                      </a:r>
+                      <a:r>
+                        <a:rPr lang="en-US" sz="2000" b="1" dirty="0" smtClean="0">
+                          <a:solidFill>
+                            <a:schemeClr val="bg1"/>
+                          </a:solidFill>
+                          <a:latin typeface="Bahnschrift SemiLight" pitchFamily="34" charset="0"/>
+                        </a:rPr>
+                        <a:t>them as information repository or as an interactive online communication mean. Five element were analyzed. Technical items, Hospital information and facilities, Admissions and medical services, Interactive online services and External Activities.</a:t>
                       </a:r>
                       <a:endParaRPr lang="en-US" sz="2000" b="1" dirty="0">
                         <a:solidFill>
@@ -9139,7 +8959,7 @@
                                     </p:set>
                                     <p:animEffect transition="in" filter="wheel(1)">
                                       <p:cBhvr>
-                                        <p:cTn id="15" dur="2000"/>
+                                        <p:cTn id="15" dur="500"/>
                                         <p:tgtEl>
                                           <p:spTgt spid="5"/>
                                         </p:tgtEl>
@@ -10892,33 +10712,15 @@
                                   </p:childTnLst>
                                 </p:cTn>
                               </p:par>
-                            </p:childTnLst>
-                          </p:cTn>
-                        </p:par>
-                      </p:childTnLst>
-                    </p:cTn>
-                  </p:par>
-                  <p:par>
-                    <p:cTn id="16" fill="hold">
-                      <p:stCondLst>
-                        <p:cond delay="indefinite"/>
-                      </p:stCondLst>
-                      <p:childTnLst>
-                        <p:par>
-                          <p:cTn id="17" fill="hold">
-                            <p:stCondLst>
-                              <p:cond delay="0"/>
-                            </p:stCondLst>
-                            <p:childTnLst>
                               <p:par>
-                                <p:cTn id="18" presetID="12" presetClass="entr" presetSubtype="4" fill="hold" grpId="0" nodeType="clickEffect">
+                                <p:cTn id="16" presetID="12" presetClass="entr" presetSubtype="4" fill="hold" grpId="0" nodeType="withEffect">
                                   <p:stCondLst>
                                     <p:cond delay="0"/>
                                   </p:stCondLst>
                                   <p:childTnLst>
                                     <p:set>
                                       <p:cBhvr>
-                                        <p:cTn id="19" dur="1" fill="hold">
+                                        <p:cTn id="17" dur="1" fill="hold">
                                           <p:stCondLst>
                                             <p:cond delay="0"/>
                                           </p:stCondLst>
@@ -10940,7 +10742,7 @@
                                     </p:set>
                                     <p:animEffect transition="in" filter="slide(fromBottom)">
                                       <p:cBhvr>
-                                        <p:cTn id="20" dur="500"/>
+                                        <p:cTn id="18" dur="500"/>
                                         <p:tgtEl>
                                           <p:spTgt spid="3">
                                             <p:txEl>
@@ -10953,33 +10755,15 @@
                                   </p:childTnLst>
                                 </p:cTn>
                               </p:par>
-                            </p:childTnLst>
-                          </p:cTn>
-                        </p:par>
-                      </p:childTnLst>
-                    </p:cTn>
-                  </p:par>
-                  <p:par>
-                    <p:cTn id="21" fill="hold">
-                      <p:stCondLst>
-                        <p:cond delay="indefinite"/>
-                      </p:stCondLst>
-                      <p:childTnLst>
-                        <p:par>
-                          <p:cTn id="22" fill="hold">
-                            <p:stCondLst>
-                              <p:cond delay="0"/>
-                            </p:stCondLst>
-                            <p:childTnLst>
                               <p:par>
-                                <p:cTn id="23" presetID="12" presetClass="entr" presetSubtype="4" fill="hold" grpId="0" nodeType="clickEffect">
+                                <p:cTn id="19" presetID="12" presetClass="entr" presetSubtype="4" fill="hold" grpId="0" nodeType="withEffect">
                                   <p:stCondLst>
                                     <p:cond delay="0"/>
                                   </p:stCondLst>
                                   <p:childTnLst>
                                     <p:set>
                                       <p:cBhvr>
-                                        <p:cTn id="24" dur="1" fill="hold">
+                                        <p:cTn id="20" dur="1" fill="hold">
                                           <p:stCondLst>
                                             <p:cond delay="0"/>
                                           </p:stCondLst>
@@ -11001,7 +10785,7 @@
                                     </p:set>
                                     <p:animEffect transition="in" filter="slide(fromBottom)">
                                       <p:cBhvr>
-                                        <p:cTn id="25" dur="500"/>
+                                        <p:cTn id="21" dur="500"/>
                                         <p:tgtEl>
                                           <p:spTgt spid="3">
                                             <p:txEl>
@@ -11014,32 +10798,100 @@
                                   </p:childTnLst>
                                 </p:cTn>
                               </p:par>
-                            </p:childTnLst>
-                          </p:cTn>
-                        </p:par>
-                      </p:childTnLst>
-                    </p:cTn>
-                  </p:par>
-                  <p:par>
-                    <p:cTn id="26" fill="hold">
-                      <p:stCondLst>
-                        <p:cond delay="indefinite"/>
-                      </p:stCondLst>
-                      <p:childTnLst>
-                        <p:par>
-                          <p:cTn id="27" fill="hold">
-                            <p:stCondLst>
-                              <p:cond delay="0"/>
-                            </p:stCondLst>
-                            <p:childTnLst>
                               <p:par>
-                                <p:cTn id="28" presetID="12" presetClass="entr" presetSubtype="4" fill="hold" grpId="0" nodeType="clickEffect">
+                                <p:cTn id="22" presetID="12" presetClass="entr" presetSubtype="4" fill="hold" grpId="0" nodeType="withEffect">
                                   <p:stCondLst>
                                     <p:cond delay="0"/>
                                   </p:stCondLst>
                                   <p:childTnLst>
                                     <p:set>
                                       <p:cBhvr>
+                                        <p:cTn id="23" dur="1" fill="hold">
+                                          <p:stCondLst>
+                                            <p:cond delay="0"/>
+                                          </p:stCondLst>
+                                        </p:cTn>
+                                        <p:tgtEl>
+                                          <p:spTgt spid="3">
+                                            <p:txEl>
+                                              <p:pRg st="3" end="3"/>
+                                            </p:txEl>
+                                          </p:spTgt>
+                                        </p:tgtEl>
+                                        <p:attrNameLst>
+                                          <p:attrName>style.visibility</p:attrName>
+                                        </p:attrNameLst>
+                                      </p:cBhvr>
+                                      <p:to>
+                                        <p:strVal val="visible"/>
+                                      </p:to>
+                                    </p:set>
+                                    <p:animEffect transition="in" filter="slide(fromBottom)">
+                                      <p:cBhvr>
+                                        <p:cTn id="24" dur="500"/>
+                                        <p:tgtEl>
+                                          <p:spTgt spid="3">
+                                            <p:txEl>
+                                              <p:pRg st="3" end="3"/>
+                                            </p:txEl>
+                                          </p:spTgt>
+                                        </p:tgtEl>
+                                      </p:cBhvr>
+                                    </p:animEffect>
+                                  </p:childTnLst>
+                                </p:cTn>
+                              </p:par>
+                              <p:par>
+                                <p:cTn id="25" presetID="12" presetClass="entr" presetSubtype="4" fill="hold" grpId="0" nodeType="withEffect">
+                                  <p:stCondLst>
+                                    <p:cond delay="0"/>
+                                  </p:stCondLst>
+                                  <p:childTnLst>
+                                    <p:set>
+                                      <p:cBhvr>
+                                        <p:cTn id="26" dur="1" fill="hold">
+                                          <p:stCondLst>
+                                            <p:cond delay="0"/>
+                                          </p:stCondLst>
+                                        </p:cTn>
+                                        <p:tgtEl>
+                                          <p:spTgt spid="3">
+                                            <p:txEl>
+                                              <p:pRg st="4" end="4"/>
+                                            </p:txEl>
+                                          </p:spTgt>
+                                        </p:tgtEl>
+                                        <p:attrNameLst>
+                                          <p:attrName>style.visibility</p:attrName>
+                                        </p:attrNameLst>
+                                      </p:cBhvr>
+                                      <p:to>
+                                        <p:strVal val="visible"/>
+                                      </p:to>
+                                    </p:set>
+                                    <p:animEffect transition="in" filter="slide(fromBottom)">
+                                      <p:cBhvr>
+                                        <p:cTn id="27" dur="500"/>
+                                        <p:tgtEl>
+                                          <p:spTgt spid="3">
+                                            <p:txEl>
+                                              <p:pRg st="4" end="4"/>
+                                            </p:txEl>
+                                          </p:spTgt>
+                                        </p:tgtEl>
+                                      </p:cBhvr>
+                                    </p:animEffect>
+                                  </p:childTnLst>
+                                </p:cTn>
+                              </p:par>
+                              <p:par>
+                                <p:cTn id="28" presetID="12" presetClass="entr" presetSubtype="4" fill="hold" grpId="0" nodeType="withEffect">
+                                  <p:stCondLst>
+                                    <p:cond delay="0"/>
+                                  </p:stCondLst>
+                                  <p:childTnLst>
+                                    <p:set>
+                                      <p:cBhvr>
                                         <p:cTn id="29" dur="1" fill="hold">
                                           <p:stCondLst>
                                             <p:cond delay="0"/>
@@ -11048,7 +10900,7 @@
                                         <p:tgtEl>
                                           <p:spTgt spid="3">
                                             <p:txEl>
-                                              <p:pRg st="3" end="3"/>
+                                              <p:pRg st="5" end="5"/>
                                             </p:txEl>
                                           </p:spTgt>
                                         </p:tgtEl>
@@ -11063,128 +10915,6 @@
                                     <p:animEffect transition="in" filter="slide(fromBottom)">
                                       <p:cBhvr>
                                         <p:cTn id="30" dur="500"/>
-                                        <p:tgtEl>
-                                          <p:spTgt spid="3">
-                                            <p:txEl>
-                                              <p:pRg st="3" end="3"/>
-                                            </p:txEl>
-                                          </p:spTgt>
-                                        </p:tgtEl>
-                                      </p:cBhvr>
-                                    </p:animEffect>
-                                  </p:childTnLst>
-                                </p:cTn>
-                              </p:par>
-                            </p:childTnLst>
-                          </p:cTn>
-                        </p:par>
-                      </p:childTnLst>
-                    </p:cTn>
-                  </p:par>
-                  <p:par>
-                    <p:cTn id="31" fill="hold">
-                      <p:stCondLst>
-                        <p:cond delay="indefinite"/>
-                      </p:stCondLst>
-                      <p:childTnLst>
-                        <p:par>
-                          <p:cTn id="32" fill="hold">
-                            <p:stCondLst>
-                              <p:cond delay="0"/>
-                            </p:stCondLst>
-                            <p:childTnLst>
-                              <p:par>
-                                <p:cTn id="33" presetID="12" presetClass="entr" presetSubtype="4" fill="hold" grpId="0" nodeType="clickEffect">
-                                  <p:stCondLst>
-                                    <p:cond delay="0"/>
-                                  </p:stCondLst>
-                                  <p:childTnLst>
-                                    <p:set>
-                                      <p:cBhvr>
-                                        <p:cTn id="34" dur="1" fill="hold">
-                                          <p:stCondLst>
-                                            <p:cond delay="0"/>
-                                          </p:stCondLst>
-                                        </p:cTn>
-                                        <p:tgtEl>
-                                          <p:spTgt spid="3">
-                                            <p:txEl>
-                                              <p:pRg st="4" end="4"/>
-                                            </p:txEl>
-                                          </p:spTgt>
-                                        </p:tgtEl>
-                                        <p:attrNameLst>
-                                          <p:attrName>style.visibility</p:attrName>
-                                        </p:attrNameLst>
-                                      </p:cBhvr>
-                                      <p:to>
-                                        <p:strVal val="visible"/>
-                                      </p:to>
-                                    </p:set>
-                                    <p:animEffect transition="in" filter="slide(fromBottom)">
-                                      <p:cBhvr>
-                                        <p:cTn id="35" dur="500"/>
-                                        <p:tgtEl>
-                                          <p:spTgt spid="3">
-                                            <p:txEl>
-                                              <p:pRg st="4" end="4"/>
-                                            </p:txEl>
-                                          </p:spTgt>
-                                        </p:tgtEl>
-                                      </p:cBhvr>
-                                    </p:animEffect>
-                                  </p:childTnLst>
-                                </p:cTn>
-                              </p:par>
-                            </p:childTnLst>
-                          </p:cTn>
-                        </p:par>
-                      </p:childTnLst>
-                    </p:cTn>
-                  </p:par>
-                  <p:par>
-                    <p:cTn id="36" fill="hold">
-                      <p:stCondLst>
-                        <p:cond delay="indefinite"/>
-                      </p:stCondLst>
-                      <p:childTnLst>
-                        <p:par>
-                          <p:cTn id="37" fill="hold">
-                            <p:stCondLst>
-                              <p:cond delay="0"/>
-                            </p:stCondLst>
-                            <p:childTnLst>
-                              <p:par>
-                                <p:cTn id="38" presetID="12" presetClass="entr" presetSubtype="4" fill="hold" grpId="0" nodeType="clickEffect">
-                                  <p:stCondLst>
-                                    <p:cond delay="0"/>
-                                  </p:stCondLst>
-                                  <p:childTnLst>
-                                    <p:set>
-                                      <p:cBhvr>
-                                        <p:cTn id="39" dur="1" fill="hold">
-                                          <p:stCondLst>
-                                            <p:cond delay="0"/>
-                                          </p:stCondLst>
-                                        </p:cTn>
-                                        <p:tgtEl>
-                                          <p:spTgt spid="3">
-                                            <p:txEl>
-                                              <p:pRg st="5" end="5"/>
-                                            </p:txEl>
-                                          </p:spTgt>
-                                        </p:tgtEl>
-                                        <p:attrNameLst>
-                                          <p:attrName>style.visibility</p:attrName>
-                                        </p:attrNameLst>
-                                      </p:cBhvr>
-                                      <p:to>
-                                        <p:strVal val="visible"/>
-                                      </p:to>
-                                    </p:set>
-                                    <p:animEffect transition="in" filter="slide(fromBottom)">
-                                      <p:cBhvr>
-                                        <p:cTn id="40" dur="500"/>
                                         <p:tgtEl>
                                           <p:spTgt spid="3">
                                             <p:txEl>
@@ -11226,7 +10956,7 @@
     </p:tnLst>
     <p:bldLst>
       <p:bldP spid="2" grpId="0"/>
-      <p:bldP spid="3" grpId="0" build="p"/>
+      <p:bldP spid="3" grpId="0" uiExpand="1" build="p"/>
     </p:bldLst>
   </p:timing>
 </p:sld>
@@ -11525,33 +11255,15 @@
                                   </p:childTnLst>
                                 </p:cTn>
                               </p:par>
-                            </p:childTnLst>
-                          </p:cTn>
-                        </p:par>
-                      </p:childTnLst>
-                    </p:cTn>
-                  </p:par>
-                  <p:par>
-                    <p:cTn id="16" fill="hold">
-                      <p:stCondLst>
-                        <p:cond delay="indefinite"/>
-                      </p:stCondLst>
-                      <p:childTnLst>
-                        <p:par>
-                          <p:cTn id="17" fill="hold">
-                            <p:stCondLst>
-                              <p:cond delay="0"/>
-                            </p:stCondLst>
-                            <p:childTnLst>
                               <p:par>
-                                <p:cTn id="18" presetID="12" presetClass="entr" presetSubtype="4" fill="hold" grpId="0" nodeType="clickEffect">
+                                <p:cTn id="16" presetID="12" presetClass="entr" presetSubtype="4" fill="hold" grpId="0" nodeType="withEffect">
                                   <p:stCondLst>
                                     <p:cond delay="0"/>
                                   </p:stCondLst>
                                   <p:childTnLst>
                                     <p:set>
                                       <p:cBhvr>
-                                        <p:cTn id="19" dur="1" fill="hold">
+                                        <p:cTn id="17" dur="1" fill="hold">
                                           <p:stCondLst>
                                             <p:cond delay="0"/>
                                           </p:stCondLst>
@@ -11573,7 +11285,7 @@
                                     </p:set>
                                     <p:animEffect transition="in" filter="slide(fromBottom)">
                                       <p:cBhvr>
-                                        <p:cTn id="20" dur="500"/>
+                                        <p:cTn id="18" dur="500"/>
                                         <p:tgtEl>
                                           <p:spTgt spid="3">
                                             <p:txEl>
@@ -11586,33 +11298,15 @@
                                   </p:childTnLst>
                                 </p:cTn>
                               </p:par>
-                            </p:childTnLst>
-                          </p:cTn>
-                        </p:par>
-                      </p:childTnLst>
-                    </p:cTn>
-                  </p:par>
-                  <p:par>
-                    <p:cTn id="21" fill="hold">
-                      <p:stCondLst>
-                        <p:cond delay="indefinite"/>
-                      </p:stCondLst>
-                      <p:childTnLst>
-                        <p:par>
-                          <p:cTn id="22" fill="hold">
-                            <p:stCondLst>
-                              <p:cond delay="0"/>
-                            </p:stCondLst>
-                            <p:childTnLst>
                               <p:par>
-                                <p:cTn id="23" presetID="12" presetClass="entr" presetSubtype="4" fill="hold" grpId="0" nodeType="clickEffect">
+                                <p:cTn id="19" presetID="12" presetClass="entr" presetSubtype="4" fill="hold" grpId="0" nodeType="withEffect">
                                   <p:stCondLst>
                                     <p:cond delay="0"/>
                                   </p:stCondLst>
                                   <p:childTnLst>
                                     <p:set>
                                       <p:cBhvr>
-                                        <p:cTn id="24" dur="1" fill="hold">
+                                        <p:cTn id="20" dur="1" fill="hold">
                                           <p:stCondLst>
                                             <p:cond delay="0"/>
                                           </p:stCondLst>
@@ -11634,7 +11328,7 @@
                                     </p:set>
                                     <p:animEffect transition="in" filter="slide(fromBottom)">
                                       <p:cBhvr>
-                                        <p:cTn id="25" dur="500"/>
+                                        <p:cTn id="21" dur="500"/>
                                         <p:tgtEl>
                                           <p:spTgt spid="3">
                                             <p:txEl>
@@ -11647,33 +11341,15 @@
                                   </p:childTnLst>
                                 </p:cTn>
                               </p:par>
-                            </p:childTnLst>
-                          </p:cTn>
-                        </p:par>
-                      </p:childTnLst>
-                    </p:cTn>
-                  </p:par>
-                  <p:par>
-                    <p:cTn id="26" fill="hold">
-                      <p:stCondLst>
-                        <p:cond delay="indefinite"/>
-                      </p:stCondLst>
-                      <p:childTnLst>
-                        <p:par>
-                          <p:cTn id="27" fill="hold">
-                            <p:stCondLst>
-                              <p:cond delay="0"/>
-                            </p:stCondLst>
-                            <p:childTnLst>
                               <p:par>
-                                <p:cTn id="28" presetID="12" presetClass="entr" presetSubtype="4" fill="hold" grpId="0" nodeType="clickEffect">
+                                <p:cTn id="22" presetID="12" presetClass="entr" presetSubtype="4" fill="hold" grpId="0" nodeType="withEffect">
                                   <p:stCondLst>
                                     <p:cond delay="0"/>
                                   </p:stCondLst>
                                   <p:childTnLst>
                                     <p:set>
                                       <p:cBhvr>
-                                        <p:cTn id="29" dur="1" fill="hold">
+                                        <p:cTn id="23" dur="1" fill="hold">
                                           <p:stCondLst>
                                             <p:cond delay="0"/>
                                           </p:stCondLst>
@@ -11695,7 +11371,7 @@
                                     </p:set>
                                     <p:animEffect transition="in" filter="slide(fromBottom)">
                                       <p:cBhvr>
-                                        <p:cTn id="30" dur="500"/>
+                                        <p:cTn id="24" dur="500"/>
                                         <p:tgtEl>
                                           <p:spTgt spid="3">
                                             <p:txEl>
@@ -11737,7 +11413,7 @@
     </p:tnLst>
     <p:bldLst>
       <p:bldP spid="2" grpId="0"/>
-      <p:bldP spid="3" grpId="0" build="p"/>
+      <p:bldP spid="3" grpId="0" uiExpand="1" build="p"/>
     </p:bldLst>
   </p:timing>
 </p:sld>
@@ -12031,33 +11707,15 @@
                                   </p:childTnLst>
                                 </p:cTn>
                               </p:par>
-                            </p:childTnLst>
-                          </p:cTn>
-                        </p:par>
-                      </p:childTnLst>
-                    </p:cTn>
-                  </p:par>
-                  <p:par>
-                    <p:cTn id="16" fill="hold">
-                      <p:stCondLst>
-                        <p:cond delay="indefinite"/>
-                      </p:stCondLst>
-                      <p:childTnLst>
-                        <p:par>
-                          <p:cTn id="17" fill="hold">
-                            <p:stCondLst>
-                              <p:cond delay="0"/>
-                            </p:stCondLst>
-                            <p:childTnLst>
                               <p:par>
-                                <p:cTn id="18" presetID="12" presetClass="entr" presetSubtype="4" fill="hold" grpId="0" nodeType="clickEffect">
+                                <p:cTn id="16" presetID="12" presetClass="entr" presetSubtype="4" fill="hold" grpId="0" nodeType="withEffect">
                                   <p:stCondLst>
                                     <p:cond delay="0"/>
                                   </p:stCondLst>
                                   <p:childTnLst>
                                     <p:set>
                                       <p:cBhvr>
-                                        <p:cTn id="19" dur="1" fill="hold">
+                                        <p:cTn id="17" dur="1" fill="hold">
                                           <p:stCondLst>
                                             <p:cond delay="0"/>
                                           </p:stCondLst>
@@ -12079,7 +11737,7 @@
                                     </p:set>
                                     <p:animEffect transition="in" filter="slide(fromBottom)">
                                       <p:cBhvr>
-                                        <p:cTn id="20" dur="500"/>
+                                        <p:cTn id="18" dur="500"/>
                                         <p:tgtEl>
                                           <p:spTgt spid="3">
                                             <p:txEl>
@@ -12092,33 +11750,15 @@
                                   </p:childTnLst>
                                 </p:cTn>
                               </p:par>
-                            </p:childTnLst>
-                          </p:cTn>
-                        </p:par>
-                      </p:childTnLst>
-                    </p:cTn>
-                  </p:par>
-                  <p:par>
-                    <p:cTn id="21" fill="hold">
-                      <p:stCondLst>
-                        <p:cond delay="indefinite"/>
-                      </p:stCondLst>
-                      <p:childTnLst>
-                        <p:par>
-                          <p:cTn id="22" fill="hold">
-                            <p:stCondLst>
-                              <p:cond delay="0"/>
-                            </p:stCondLst>
-                            <p:childTnLst>
                               <p:par>
-                                <p:cTn id="23" presetID="12" presetClass="entr" presetSubtype="4" fill="hold" grpId="0" nodeType="clickEffect">
+                                <p:cTn id="19" presetID="12" presetClass="entr" presetSubtype="4" fill="hold" grpId="0" nodeType="withEffect">
                                   <p:stCondLst>
                                     <p:cond delay="0"/>
                                   </p:stCondLst>
                                   <p:childTnLst>
                                     <p:set>
                                       <p:cBhvr>
-                                        <p:cTn id="24" dur="1" fill="hold">
+                                        <p:cTn id="20" dur="1" fill="hold">
                                           <p:stCondLst>
                                             <p:cond delay="0"/>
                                           </p:stCondLst>
@@ -12140,7 +11780,7 @@
                                     </p:set>
                                     <p:animEffect transition="in" filter="slide(fromBottom)">
                                       <p:cBhvr>
-                                        <p:cTn id="25" dur="500"/>
+                                        <p:cTn id="21" dur="500"/>
                                         <p:tgtEl>
                                           <p:spTgt spid="3">
                                             <p:txEl>
@@ -12182,7 +11822,7 @@
     </p:tnLst>
     <p:bldLst>
       <p:bldP spid="2" grpId="0"/>
-      <p:bldP spid="3" grpId="0" build="p"/>
+      <p:bldP spid="3" grpId="0" uiExpand="1" build="p"/>
     </p:bldLst>
   </p:timing>
 </p:sld>

</xml_diff>